<commit_message>
added some missing information to powerpoint
</commit_message>
<xml_diff>
--- a/Documents/Web-projektin_wireframe_alustava_suunnitelma.pptx
+++ b/Documents/Web-projektin_wireframe_alustava_suunnitelma.pptx
@@ -128,327 +128,6 @@
 </p1510:revInfo>
 </file>
 
-<file path=ppt/changesInfos/changesInfo1.xml><?xml version="1.0" encoding="utf-8"?>
-<pc:chgInfo xmlns:a="http://schemas.openxmlformats.org/drawingml/2006/main" xmlns:r="http://schemas.openxmlformats.org/officeDocument/2006/relationships" xmlns:ac="http://schemas.microsoft.com/office/drawing/2013/main/command" xmlns:pc="http://schemas.microsoft.com/office/powerpoint/2013/main/command">
-  <pc:docChgLst>
-    <pc:chgData name="päivi Karhumaa" userId="9c1c24ce7b3434a2" providerId="LiveId" clId="{9265BD63-F028-41AA-B964-165FBECB6BD6}"/>
-    <pc:docChg chg="undo custSel addSld delSld modSld">
-      <pc:chgData name="päivi Karhumaa" userId="9c1c24ce7b3434a2" providerId="LiveId" clId="{9265BD63-F028-41AA-B964-165FBECB6BD6}" dt="2022-04-23T08:49:49.324" v="1337" actId="20577"/>
-      <pc:docMkLst>
-        <pc:docMk/>
-      </pc:docMkLst>
-      <pc:sldChg chg="addSp delSp modSp mod">
-        <pc:chgData name="päivi Karhumaa" userId="9c1c24ce7b3434a2" providerId="LiveId" clId="{9265BD63-F028-41AA-B964-165FBECB6BD6}" dt="2022-04-23T08:48:48.167" v="1296" actId="313"/>
-        <pc:sldMkLst>
-          <pc:docMk/>
-          <pc:sldMk cId="826859197" sldId="257"/>
-        </pc:sldMkLst>
-        <pc:spChg chg="add mod">
-          <ac:chgData name="päivi Karhumaa" userId="9c1c24ce7b3434a2" providerId="LiveId" clId="{9265BD63-F028-41AA-B964-165FBECB6BD6}" dt="2022-04-23T08:16:36.573" v="41" actId="20577"/>
-          <ac:spMkLst>
-            <pc:docMk/>
-            <pc:sldMk cId="826859197" sldId="257"/>
-            <ac:spMk id="2" creationId="{B595C01B-4ECE-4F52-950E-A21572EF0E09}"/>
-          </ac:spMkLst>
-        </pc:spChg>
-        <pc:spChg chg="add mod">
-          <ac:chgData name="päivi Karhumaa" userId="9c1c24ce7b3434a2" providerId="LiveId" clId="{9265BD63-F028-41AA-B964-165FBECB6BD6}" dt="2022-04-23T08:46:08.917" v="1030" actId="1076"/>
-          <ac:spMkLst>
-            <pc:docMk/>
-            <pc:sldMk cId="826859197" sldId="257"/>
-            <ac:spMk id="3" creationId="{0A857257-4FBF-48B4-B222-FDE68E81D7CC}"/>
-          </ac:spMkLst>
-        </pc:spChg>
-        <pc:spChg chg="add del mod">
-          <ac:chgData name="päivi Karhumaa" userId="9c1c24ce7b3434a2" providerId="LiveId" clId="{9265BD63-F028-41AA-B964-165FBECB6BD6}" dt="2022-04-23T08:17:11.843" v="46" actId="478"/>
-          <ac:spMkLst>
-            <pc:docMk/>
-            <pc:sldMk cId="826859197" sldId="257"/>
-            <ac:spMk id="4" creationId="{E1AD8C4E-D3C8-4584-97C3-88F68EF5D808}"/>
-          </ac:spMkLst>
-        </pc:spChg>
-        <pc:spChg chg="add mod">
-          <ac:chgData name="päivi Karhumaa" userId="9c1c24ce7b3434a2" providerId="LiveId" clId="{9265BD63-F028-41AA-B964-165FBECB6BD6}" dt="2022-04-23T08:46:15.599" v="1031" actId="1076"/>
-          <ac:spMkLst>
-            <pc:docMk/>
-            <pc:sldMk cId="826859197" sldId="257"/>
-            <ac:spMk id="5" creationId="{834C4465-1F1F-4E7E-8911-705915BB17F2}"/>
-          </ac:spMkLst>
-        </pc:spChg>
-        <pc:spChg chg="add mod">
-          <ac:chgData name="päivi Karhumaa" userId="9c1c24ce7b3434a2" providerId="LiveId" clId="{9265BD63-F028-41AA-B964-165FBECB6BD6}" dt="2022-04-23T08:48:27.210" v="1292" actId="20577"/>
-          <ac:spMkLst>
-            <pc:docMk/>
-            <pc:sldMk cId="826859197" sldId="257"/>
-            <ac:spMk id="6" creationId="{194380F1-C611-48B9-9669-64E8DA35842D}"/>
-          </ac:spMkLst>
-        </pc:spChg>
-        <pc:spChg chg="add mod">
-          <ac:chgData name="päivi Karhumaa" userId="9c1c24ce7b3434a2" providerId="LiveId" clId="{9265BD63-F028-41AA-B964-165FBECB6BD6}" dt="2022-04-23T08:21:42.064" v="221" actId="20577"/>
-          <ac:spMkLst>
-            <pc:docMk/>
-            <pc:sldMk cId="826859197" sldId="257"/>
-            <ac:spMk id="7" creationId="{46F90267-119C-4BD8-A095-1FE950AEDE32}"/>
-          </ac:spMkLst>
-        </pc:spChg>
-        <pc:spChg chg="add mod">
-          <ac:chgData name="päivi Karhumaa" userId="9c1c24ce7b3434a2" providerId="LiveId" clId="{9265BD63-F028-41AA-B964-165FBECB6BD6}" dt="2022-04-23T08:48:48.167" v="1296" actId="313"/>
-          <ac:spMkLst>
-            <pc:docMk/>
-            <pc:sldMk cId="826859197" sldId="257"/>
-            <ac:spMk id="8" creationId="{3F40C0CA-D9D0-404F-9887-5EAF1E29EB8E}"/>
-          </ac:spMkLst>
-        </pc:spChg>
-        <pc:spChg chg="add mod">
-          <ac:chgData name="päivi Karhumaa" userId="9c1c24ce7b3434a2" providerId="LiveId" clId="{9265BD63-F028-41AA-B964-165FBECB6BD6}" dt="2022-04-23T08:48:19.565" v="1277" actId="1076"/>
-          <ac:spMkLst>
-            <pc:docMk/>
-            <pc:sldMk cId="826859197" sldId="257"/>
-            <ac:spMk id="9" creationId="{6665A186-20B5-4C99-B2E9-EEDDE0D770D4}"/>
-          </ac:spMkLst>
-        </pc:spChg>
-        <pc:spChg chg="add mod">
-          <ac:chgData name="päivi Karhumaa" userId="9c1c24ce7b3434a2" providerId="LiveId" clId="{9265BD63-F028-41AA-B964-165FBECB6BD6}" dt="2022-04-23T08:46:34.023" v="1032" actId="1076"/>
-          <ac:spMkLst>
-            <pc:docMk/>
-            <pc:sldMk cId="826859197" sldId="257"/>
-            <ac:spMk id="10" creationId="{122D211D-6988-4D3E-93C1-971206172C26}"/>
-          </ac:spMkLst>
-        </pc:spChg>
-      </pc:sldChg>
-      <pc:sldChg chg="addSp delSp modSp add mod">
-        <pc:chgData name="päivi Karhumaa" userId="9c1c24ce7b3434a2" providerId="LiveId" clId="{9265BD63-F028-41AA-B964-165FBECB6BD6}" dt="2022-04-23T08:49:07.985" v="1298" actId="1076"/>
-        <pc:sldMkLst>
-          <pc:docMk/>
-          <pc:sldMk cId="4100462614" sldId="260"/>
-        </pc:sldMkLst>
-        <pc:spChg chg="mod">
-          <ac:chgData name="päivi Karhumaa" userId="9c1c24ce7b3434a2" providerId="LiveId" clId="{9265BD63-F028-41AA-B964-165FBECB6BD6}" dt="2022-04-23T08:40:40.728" v="878" actId="1076"/>
-          <ac:spMkLst>
-            <pc:docMk/>
-            <pc:sldMk cId="4100462614" sldId="260"/>
-            <ac:spMk id="2" creationId="{B595C01B-4ECE-4F52-950E-A21572EF0E09}"/>
-          </ac:spMkLst>
-        </pc:spChg>
-        <pc:spChg chg="add mod">
-          <ac:chgData name="päivi Karhumaa" userId="9c1c24ce7b3434a2" providerId="LiveId" clId="{9265BD63-F028-41AA-B964-165FBECB6BD6}" dt="2022-04-23T08:43:18.161" v="946" actId="14100"/>
-          <ac:spMkLst>
-            <pc:docMk/>
-            <pc:sldMk cId="4100462614" sldId="260"/>
-            <ac:spMk id="3" creationId="{C88F9F5A-735E-404C-B9C2-BFCEEF0444A5}"/>
-          </ac:spMkLst>
-        </pc:spChg>
-        <pc:spChg chg="add mod">
-          <ac:chgData name="päivi Karhumaa" userId="9c1c24ce7b3434a2" providerId="LiveId" clId="{9265BD63-F028-41AA-B964-165FBECB6BD6}" dt="2022-04-23T08:49:05.315" v="1297" actId="1076"/>
-          <ac:spMkLst>
-            <pc:docMk/>
-            <pc:sldMk cId="4100462614" sldId="260"/>
-            <ac:spMk id="4" creationId="{3BCAB200-FA0A-491F-8BE6-8106C31343FC}"/>
-          </ac:spMkLst>
-        </pc:spChg>
-        <pc:spChg chg="add del mod">
-          <ac:chgData name="päivi Karhumaa" userId="9c1c24ce7b3434a2" providerId="LiveId" clId="{9265BD63-F028-41AA-B964-165FBECB6BD6}" dt="2022-04-23T08:40:41.362" v="879" actId="33987"/>
-          <ac:spMkLst>
-            <pc:docMk/>
-            <pc:sldMk cId="4100462614" sldId="260"/>
-            <ac:spMk id="5" creationId="{C1C72EC3-2C7A-4B78-AE15-CBE067E50B5A}"/>
-          </ac:spMkLst>
-        </pc:spChg>
-        <pc:spChg chg="add del mod">
-          <ac:chgData name="päivi Karhumaa" userId="9c1c24ce7b3434a2" providerId="LiveId" clId="{9265BD63-F028-41AA-B964-165FBECB6BD6}" dt="2022-04-23T08:41:54.964" v="929" actId="478"/>
-          <ac:spMkLst>
-            <pc:docMk/>
-            <pc:sldMk cId="4100462614" sldId="260"/>
-            <ac:spMk id="6" creationId="{FE51155C-A046-467F-9573-5C73F3FC3E86}"/>
-          </ac:spMkLst>
-        </pc:spChg>
-        <pc:spChg chg="add mod">
-          <ac:chgData name="päivi Karhumaa" userId="9c1c24ce7b3434a2" providerId="LiveId" clId="{9265BD63-F028-41AA-B964-165FBECB6BD6}" dt="2022-04-23T08:49:07.985" v="1298" actId="1076"/>
-          <ac:spMkLst>
-            <pc:docMk/>
-            <pc:sldMk cId="4100462614" sldId="260"/>
-            <ac:spMk id="7" creationId="{B58E9BE7-D04F-4AB7-B797-707081845A72}"/>
-          </ac:spMkLst>
-        </pc:spChg>
-        <pc:spChg chg="add mod">
-          <ac:chgData name="päivi Karhumaa" userId="9c1c24ce7b3434a2" providerId="LiveId" clId="{9265BD63-F028-41AA-B964-165FBECB6BD6}" dt="2022-04-23T08:43:21.440" v="947" actId="1076"/>
-          <ac:spMkLst>
-            <pc:docMk/>
-            <pc:sldMk cId="4100462614" sldId="260"/>
-            <ac:spMk id="8" creationId="{DCA97174-64D4-4DF3-A75D-314E6E6B51F0}"/>
-          </ac:spMkLst>
-        </pc:spChg>
-        <pc:spChg chg="add mod">
-          <ac:chgData name="päivi Karhumaa" userId="9c1c24ce7b3434a2" providerId="LiveId" clId="{9265BD63-F028-41AA-B964-165FBECB6BD6}" dt="2022-04-23T08:44:18.296" v="1001" actId="13926"/>
-          <ac:spMkLst>
-            <pc:docMk/>
-            <pc:sldMk cId="4100462614" sldId="260"/>
-            <ac:spMk id="9" creationId="{C603567F-389B-4147-AF50-DC8590DC3BCE}"/>
-          </ac:spMkLst>
-        </pc:spChg>
-        <pc:spChg chg="add mod">
-          <ac:chgData name="päivi Karhumaa" userId="9c1c24ce7b3434a2" providerId="LiveId" clId="{9265BD63-F028-41AA-B964-165FBECB6BD6}" dt="2022-04-23T08:44:08.602" v="1000" actId="14100"/>
-          <ac:spMkLst>
-            <pc:docMk/>
-            <pc:sldMk cId="4100462614" sldId="260"/>
-            <ac:spMk id="10" creationId="{74275A46-CFA6-4613-AAAB-2FEAD44F5F46}"/>
-          </ac:spMkLst>
-        </pc:spChg>
-        <pc:spChg chg="add mod">
-          <ac:chgData name="päivi Karhumaa" userId="9c1c24ce7b3434a2" providerId="LiveId" clId="{9265BD63-F028-41AA-B964-165FBECB6BD6}" dt="2022-04-23T08:45:40.276" v="1025" actId="207"/>
-          <ac:spMkLst>
-            <pc:docMk/>
-            <pc:sldMk cId="4100462614" sldId="260"/>
-            <ac:spMk id="11" creationId="{497E4504-4F25-4FF1-B79B-68D3A86BE623}"/>
-          </ac:spMkLst>
-        </pc:spChg>
-        <pc:spChg chg="add mod">
-          <ac:chgData name="päivi Karhumaa" userId="9c1c24ce7b3434a2" providerId="LiveId" clId="{9265BD63-F028-41AA-B964-165FBECB6BD6}" dt="2022-04-23T08:45:30.992" v="1024" actId="20577"/>
-          <ac:spMkLst>
-            <pc:docMk/>
-            <pc:sldMk cId="4100462614" sldId="260"/>
-            <ac:spMk id="12" creationId="{F8BFF660-DBE8-4332-BC5E-5B041BE48211}"/>
-          </ac:spMkLst>
-        </pc:spChg>
-      </pc:sldChg>
-      <pc:sldChg chg="add">
-        <pc:chgData name="päivi Karhumaa" userId="9c1c24ce7b3434a2" providerId="LiveId" clId="{9265BD63-F028-41AA-B964-165FBECB6BD6}" dt="2022-04-23T08:13:54.683" v="4" actId="2890"/>
-        <pc:sldMkLst>
-          <pc:docMk/>
-          <pc:sldMk cId="1512752993" sldId="261"/>
-        </pc:sldMkLst>
-      </pc:sldChg>
-      <pc:sldChg chg="addSp delSp modSp new mod">
-        <pc:chgData name="päivi Karhumaa" userId="9c1c24ce7b3434a2" providerId="LiveId" clId="{9265BD63-F028-41AA-B964-165FBECB6BD6}" dt="2022-04-23T08:49:49.324" v="1337" actId="20577"/>
-        <pc:sldMkLst>
-          <pc:docMk/>
-          <pc:sldMk cId="3021627228" sldId="262"/>
-        </pc:sldMkLst>
-        <pc:spChg chg="add mod">
-          <ac:chgData name="päivi Karhumaa" userId="9c1c24ce7b3434a2" providerId="LiveId" clId="{9265BD63-F028-41AA-B964-165FBECB6BD6}" dt="2022-04-23T08:27:48.491" v="553" actId="1076"/>
-          <ac:spMkLst>
-            <pc:docMk/>
-            <pc:sldMk cId="3021627228" sldId="262"/>
-            <ac:spMk id="2" creationId="{0B062F56-A17C-41CE-BBA0-48436B13D2CD}"/>
-          </ac:spMkLst>
-        </pc:spChg>
-        <pc:spChg chg="add mod">
-          <ac:chgData name="päivi Karhumaa" userId="9c1c24ce7b3434a2" providerId="LiveId" clId="{9265BD63-F028-41AA-B964-165FBECB6BD6}" dt="2022-04-23T08:27:28.602" v="548" actId="14100"/>
-          <ac:spMkLst>
-            <pc:docMk/>
-            <pc:sldMk cId="3021627228" sldId="262"/>
-            <ac:spMk id="3" creationId="{E41E6CCF-FFF4-4E53-BD6D-6E30A02D5777}"/>
-          </ac:spMkLst>
-        </pc:spChg>
-        <pc:spChg chg="add mod">
-          <ac:chgData name="päivi Karhumaa" userId="9c1c24ce7b3434a2" providerId="LiveId" clId="{9265BD63-F028-41AA-B964-165FBECB6BD6}" dt="2022-04-23T08:29:27.878" v="615" actId="14100"/>
-          <ac:spMkLst>
-            <pc:docMk/>
-            <pc:sldMk cId="3021627228" sldId="262"/>
-            <ac:spMk id="4" creationId="{928AF3F9-64E7-4E17-912E-FD6C1FFC7B56}"/>
-          </ac:spMkLst>
-        </pc:spChg>
-        <pc:spChg chg="add mod">
-          <ac:chgData name="päivi Karhumaa" userId="9c1c24ce7b3434a2" providerId="LiveId" clId="{9265BD63-F028-41AA-B964-165FBECB6BD6}" dt="2022-04-23T08:31:37.802" v="630" actId="14100"/>
-          <ac:spMkLst>
-            <pc:docMk/>
-            <pc:sldMk cId="3021627228" sldId="262"/>
-            <ac:spMk id="5" creationId="{E9673A41-187E-4FE7-BFEE-2B080FA4A5FB}"/>
-          </ac:spMkLst>
-        </pc:spChg>
-        <pc:spChg chg="add mod">
-          <ac:chgData name="päivi Karhumaa" userId="9c1c24ce7b3434a2" providerId="LiveId" clId="{9265BD63-F028-41AA-B964-165FBECB6BD6}" dt="2022-04-23T08:31:57.890" v="635" actId="1076"/>
-          <ac:spMkLst>
-            <pc:docMk/>
-            <pc:sldMk cId="3021627228" sldId="262"/>
-            <ac:spMk id="6" creationId="{7A29F736-E35D-4499-B550-1E0BA7B9F34E}"/>
-          </ac:spMkLst>
-        </pc:spChg>
-        <pc:spChg chg="add mod">
-          <ac:chgData name="päivi Karhumaa" userId="9c1c24ce7b3434a2" providerId="LiveId" clId="{9265BD63-F028-41AA-B964-165FBECB6BD6}" dt="2022-04-23T08:34:03.657" v="674" actId="1076"/>
-          <ac:spMkLst>
-            <pc:docMk/>
-            <pc:sldMk cId="3021627228" sldId="262"/>
-            <ac:spMk id="7" creationId="{319232F9-6688-4C16-84EA-F0BD83213B99}"/>
-          </ac:spMkLst>
-        </pc:spChg>
-        <pc:spChg chg="add mod">
-          <ac:chgData name="päivi Karhumaa" userId="9c1c24ce7b3434a2" providerId="LiveId" clId="{9265BD63-F028-41AA-B964-165FBECB6BD6}" dt="2022-04-23T08:32:41.956" v="648" actId="20577"/>
-          <ac:spMkLst>
-            <pc:docMk/>
-            <pc:sldMk cId="3021627228" sldId="262"/>
-            <ac:spMk id="8" creationId="{611A96BC-DC52-496C-83EA-6877BFBB78FB}"/>
-          </ac:spMkLst>
-        </pc:spChg>
-        <pc:spChg chg="add mod">
-          <ac:chgData name="päivi Karhumaa" userId="9c1c24ce7b3434a2" providerId="LiveId" clId="{9265BD63-F028-41AA-B964-165FBECB6BD6}" dt="2022-04-23T08:49:49.324" v="1337" actId="20577"/>
-          <ac:spMkLst>
-            <pc:docMk/>
-            <pc:sldMk cId="3021627228" sldId="262"/>
-            <ac:spMk id="9" creationId="{C75ECC6B-0D6D-426D-AB4F-2A923081AE9C}"/>
-          </ac:spMkLst>
-        </pc:spChg>
-        <pc:spChg chg="add mod">
-          <ac:chgData name="päivi Karhumaa" userId="9c1c24ce7b3434a2" providerId="LiveId" clId="{9265BD63-F028-41AA-B964-165FBECB6BD6}" dt="2022-04-23T08:35:10.482" v="709" actId="20577"/>
-          <ac:spMkLst>
-            <pc:docMk/>
-            <pc:sldMk cId="3021627228" sldId="262"/>
-            <ac:spMk id="10" creationId="{8A98FDD0-CC58-436E-94FA-5EDD356BE692}"/>
-          </ac:spMkLst>
-        </pc:spChg>
-        <pc:spChg chg="add del mod">
-          <ac:chgData name="päivi Karhumaa" userId="9c1c24ce7b3434a2" providerId="LiveId" clId="{9265BD63-F028-41AA-B964-165FBECB6BD6}" dt="2022-04-23T08:33:42.525" v="670" actId="21"/>
-          <ac:spMkLst>
-            <pc:docMk/>
-            <pc:sldMk cId="3021627228" sldId="262"/>
-            <ac:spMk id="11" creationId="{1003DAC9-6E6E-4684-9816-52B032659FFC}"/>
-          </ac:spMkLst>
-        </pc:spChg>
-        <pc:spChg chg="add del mod">
-          <ac:chgData name="päivi Karhumaa" userId="9c1c24ce7b3434a2" providerId="LiveId" clId="{9265BD63-F028-41AA-B964-165FBECB6BD6}" dt="2022-04-23T08:34:17.781" v="677" actId="21"/>
-          <ac:spMkLst>
-            <pc:docMk/>
-            <pc:sldMk cId="3021627228" sldId="262"/>
-            <ac:spMk id="15" creationId="{5422FED6-E3D7-42D9-8399-23C9C2757D6C}"/>
-          </ac:spMkLst>
-        </pc:spChg>
-        <pc:spChg chg="add del mod">
-          <ac:chgData name="päivi Karhumaa" userId="9c1c24ce7b3434a2" providerId="LiveId" clId="{9265BD63-F028-41AA-B964-165FBECB6BD6}" dt="2022-04-23T08:34:26.825" v="679"/>
-          <ac:spMkLst>
-            <pc:docMk/>
-            <pc:sldMk cId="3021627228" sldId="262"/>
-            <ac:spMk id="16" creationId="{746CAA0D-C78B-43A7-9434-F0F0811075B3}"/>
-          </ac:spMkLst>
-        </pc:spChg>
-        <pc:cxnChg chg="add mod">
-          <ac:chgData name="päivi Karhumaa" userId="9c1c24ce7b3434a2" providerId="LiveId" clId="{9265BD63-F028-41AA-B964-165FBECB6BD6}" dt="2022-04-23T08:34:48.610" v="682" actId="14100"/>
-          <ac:cxnSpMkLst>
-            <pc:docMk/>
-            <pc:sldMk cId="3021627228" sldId="262"/>
-            <ac:cxnSpMk id="13" creationId="{1E378052-665F-4744-94C8-4136E30021C2}"/>
-          </ac:cxnSpMkLst>
-        </pc:cxnChg>
-        <pc:cxnChg chg="add mod">
-          <ac:chgData name="päivi Karhumaa" userId="9c1c24ce7b3434a2" providerId="LiveId" clId="{9265BD63-F028-41AA-B964-165FBECB6BD6}" dt="2022-04-23T08:34:51.186" v="683" actId="14100"/>
-          <ac:cxnSpMkLst>
-            <pc:docMk/>
-            <pc:sldMk cId="3021627228" sldId="262"/>
-            <ac:cxnSpMk id="18" creationId="{1972F563-1388-4D86-ABFB-12CD2838D6C8}"/>
-          </ac:cxnSpMkLst>
-        </pc:cxnChg>
-      </pc:sldChg>
-      <pc:sldChg chg="add del">
-        <pc:chgData name="päivi Karhumaa" userId="9c1c24ce7b3434a2" providerId="LiveId" clId="{9265BD63-F028-41AA-B964-165FBECB6BD6}" dt="2022-04-23T08:16:16.113" v="36"/>
-        <pc:sldMkLst>
-          <pc:docMk/>
-          <pc:sldMk cId="3023106556" sldId="264"/>
-        </pc:sldMkLst>
-      </pc:sldChg>
-    </pc:docChg>
-  </pc:docChgLst>
-</pc:chgInfo>
-</file>
-
 <file path=ppt/slideLayouts/slideLayout1.xml><?xml version="1.0" encoding="utf-8"?>
 <p:sldLayout xmlns:a="http://schemas.openxmlformats.org/drawingml/2006/main" xmlns:r="http://schemas.openxmlformats.org/officeDocument/2006/relationships" xmlns:p="http://schemas.openxmlformats.org/presentationml/2006/main" type="title" preserve="1">
   <p:cSld name="Otsikkodia">
@@ -578,7 +257,7 @@
           <a:p>
             <a:fld id="{A02ABAE3-D89C-4001-9AEC-5083F82B749C}" type="datetimeFigureOut">
               <a:rPr lang="fi-FI" smtClean="0"/>
-              <a:t>23.4.2022</a:t>
+              <a:t>10.5.2022</a:t>
             </a:fld>
             <a:endParaRPr lang="fi-FI"/>
           </a:p>
@@ -746,7 +425,7 @@
           <a:p>
             <a:fld id="{A02ABAE3-D89C-4001-9AEC-5083F82B749C}" type="datetimeFigureOut">
               <a:rPr lang="fi-FI" smtClean="0"/>
-              <a:t>23.4.2022</a:t>
+              <a:t>10.5.2022</a:t>
             </a:fld>
             <a:endParaRPr lang="fi-FI"/>
           </a:p>
@@ -924,7 +603,7 @@
           <a:p>
             <a:fld id="{A02ABAE3-D89C-4001-9AEC-5083F82B749C}" type="datetimeFigureOut">
               <a:rPr lang="fi-FI" smtClean="0"/>
-              <a:t>23.4.2022</a:t>
+              <a:t>10.5.2022</a:t>
             </a:fld>
             <a:endParaRPr lang="fi-FI"/>
           </a:p>
@@ -1092,7 +771,7 @@
           <a:p>
             <a:fld id="{A02ABAE3-D89C-4001-9AEC-5083F82B749C}" type="datetimeFigureOut">
               <a:rPr lang="fi-FI" smtClean="0"/>
-              <a:t>23.4.2022</a:t>
+              <a:t>10.5.2022</a:t>
             </a:fld>
             <a:endParaRPr lang="fi-FI"/>
           </a:p>
@@ -1337,7 +1016,7 @@
           <a:p>
             <a:fld id="{A02ABAE3-D89C-4001-9AEC-5083F82B749C}" type="datetimeFigureOut">
               <a:rPr lang="fi-FI" smtClean="0"/>
-              <a:t>23.4.2022</a:t>
+              <a:t>10.5.2022</a:t>
             </a:fld>
             <a:endParaRPr lang="fi-FI"/>
           </a:p>
@@ -1566,7 +1245,7 @@
           <a:p>
             <a:fld id="{A02ABAE3-D89C-4001-9AEC-5083F82B749C}" type="datetimeFigureOut">
               <a:rPr lang="fi-FI" smtClean="0"/>
-              <a:t>23.4.2022</a:t>
+              <a:t>10.5.2022</a:t>
             </a:fld>
             <a:endParaRPr lang="fi-FI"/>
           </a:p>
@@ -1930,7 +1609,7 @@
           <a:p>
             <a:fld id="{A02ABAE3-D89C-4001-9AEC-5083F82B749C}" type="datetimeFigureOut">
               <a:rPr lang="fi-FI" smtClean="0"/>
-              <a:t>23.4.2022</a:t>
+              <a:t>10.5.2022</a:t>
             </a:fld>
             <a:endParaRPr lang="fi-FI"/>
           </a:p>
@@ -2047,7 +1726,7 @@
           <a:p>
             <a:fld id="{A02ABAE3-D89C-4001-9AEC-5083F82B749C}" type="datetimeFigureOut">
               <a:rPr lang="fi-FI" smtClean="0"/>
-              <a:t>23.4.2022</a:t>
+              <a:t>10.5.2022</a:t>
             </a:fld>
             <a:endParaRPr lang="fi-FI"/>
           </a:p>
@@ -2142,7 +1821,7 @@
           <a:p>
             <a:fld id="{A02ABAE3-D89C-4001-9AEC-5083F82B749C}" type="datetimeFigureOut">
               <a:rPr lang="fi-FI" smtClean="0"/>
-              <a:t>23.4.2022</a:t>
+              <a:t>10.5.2022</a:t>
             </a:fld>
             <a:endParaRPr lang="fi-FI"/>
           </a:p>
@@ -2417,7 +2096,7 @@
           <a:p>
             <a:fld id="{A02ABAE3-D89C-4001-9AEC-5083F82B749C}" type="datetimeFigureOut">
               <a:rPr lang="fi-FI" smtClean="0"/>
-              <a:t>23.4.2022</a:t>
+              <a:t>10.5.2022</a:t>
             </a:fld>
             <a:endParaRPr lang="fi-FI"/>
           </a:p>
@@ -2669,7 +2348,7 @@
           <a:p>
             <a:fld id="{A02ABAE3-D89C-4001-9AEC-5083F82B749C}" type="datetimeFigureOut">
               <a:rPr lang="fi-FI" smtClean="0"/>
-              <a:t>23.4.2022</a:t>
+              <a:t>10.5.2022</a:t>
             </a:fld>
             <a:endParaRPr lang="fi-FI"/>
           </a:p>
@@ -2880,7 +2559,7 @@
           <a:p>
             <a:fld id="{A02ABAE3-D89C-4001-9AEC-5083F82B749C}" type="datetimeFigureOut">
               <a:rPr lang="fi-FI" smtClean="0"/>
-              <a:t>23.4.2022</a:t>
+              <a:t>10.5.2022</a:t>
             </a:fld>
             <a:endParaRPr lang="fi-FI"/>
           </a:p>
@@ -3457,8 +3136,71 @@
               <a:rPr lang="fi-FI" dirty="0">
                 <a:cs typeface="Calibri"/>
               </a:rPr>
-              <a:t>Yhteinen värimaailma ja tyyli pääsivun kanssa</a:t>
-            </a:r>
+              <a:t>Yhteinen värimaailma ja tyyli pääsivun kanssa </a:t>
+            </a:r>
+            <a:r>
+              <a:rPr lang="fi-FI" b="0" dirty="0" err="1">
+                <a:effectLst/>
+              </a:rPr>
+              <a:t>rgb</a:t>
+            </a:r>
+            <a:r>
+              <a:rPr lang="fi-FI" b="0" dirty="0">
+                <a:effectLst/>
+              </a:rPr>
+              <a:t>(231, 241, 149); </a:t>
+            </a:r>
+            <a:r>
+              <a:rPr lang="fi-FI" b="0" dirty="0" err="1">
+                <a:effectLst/>
+              </a:rPr>
+              <a:t>rgb</a:t>
+            </a:r>
+            <a:r>
+              <a:rPr lang="fi-FI" b="0" dirty="0">
+                <a:effectLst/>
+              </a:rPr>
+              <a:t>(151,219,174); </a:t>
+            </a:r>
+            <a:r>
+              <a:rPr lang="fi-FI" b="0" dirty="0" err="1">
+                <a:effectLst/>
+              </a:rPr>
+              <a:t>rgb</a:t>
+            </a:r>
+            <a:r>
+              <a:rPr lang="fi-FI" b="0" dirty="0">
+                <a:effectLst/>
+              </a:rPr>
+              <a:t>(244,187,187);pastelliset pehmeät värit (värikartta </a:t>
+            </a:r>
+            <a:r>
+              <a:rPr lang="fi-FI" b="0" dirty="0" err="1">
+                <a:effectLst/>
+              </a:rPr>
+              <a:t>M.Rekinen</a:t>
+            </a:r>
+            <a:r>
+              <a:rPr lang="fi-FI" b="0" dirty="0">
+                <a:effectLst/>
+              </a:rPr>
+              <a:t>, on projektin </a:t>
+            </a:r>
+            <a:r>
+              <a:rPr lang="fi-FI" b="0" dirty="0" err="1">
+                <a:effectLst/>
+              </a:rPr>
+              <a:t>repositoriossa</a:t>
+            </a:r>
+            <a:r>
+              <a:rPr lang="fi-FI" b="0" dirty="0">
+                <a:effectLst/>
+              </a:rPr>
+              <a:t>)</a:t>
+            </a:r>
+            <a:endParaRPr lang="fi-FI" dirty="0">
+              <a:cs typeface="Calibri"/>
+            </a:endParaRPr>
           </a:p>
           <a:p>
             <a:r>

</xml_diff>